<commit_message>
something i dont know what fuck it is has changed
</commit_message>
<xml_diff>
--- a/Discussion/Dis1/part1.pptx
+++ b/Discussion/Dis1/part1.pptx
@@ -4180,7 +4180,7 @@
                 </a:solidFill>
                 <a:latin typeface="PingFang SC"/>
               </a:rPr>
-              <a:t>其 二，尽可能好的数据传输服务。对于数据的传输来说， 网络层的最主要目的是增大数据传输的速率，网络层不需要考虑数据的完整性，数据的完整性和正确性交给端系统去检测就行了，因此在数据传输中，对于网络层只 能要求其提供尽可能好的数据传输服务，而不可能寄希望于网络层提供数据完整性的服务。这种设计原则可以 使得传输的速率最大化，同时也为多种服务的实现提 供了数据传输方面的保证。现在广泛使用的</a:t>
+              <a:t>其 二，尽可能好的数据传输服务。对于数据的传输来说， 网络层的最主要目的是增大数据传输的速率，网络层不需要考虑数据的完整性，这些工作都给端系统去检测就行了，因此在数据传输中，对于网络层只 能要求其提供尽可能好的数据传输服务，而不可能要求它提供数据完整性的服务。这种设计原则可以 使得传输的速率最大化，同时也能够为多种服务的实现提 供数据传输方面的保证。比如我们现在广泛使用的</a:t>
             </a:r>
             <a:r>
               <a:rPr lang="en-US" altLang="zh-CN" dirty="0">
@@ -4198,7 +4198,7 @@
                 </a:solidFill>
                 <a:latin typeface="PingFang SC"/>
               </a:rPr>
-              <a:t>协议也只能够用确定重传的机制来保证数据的一致性和完整性，因此这对于端系统的检测数据完整性和保证数据的 正确性提出了更高的要求。</a:t>
+              <a:t>协议也只能够用确定重传的机制来保证数据的一致性和完整性，因此这对于端系统检测数据完整性和保证数据的 正确性提出了更高的要求。</a:t>
             </a:r>
             <a:endParaRPr lang="zh-CN" altLang="en-US" dirty="0"/>
           </a:p>
@@ -4546,7 +4546,7 @@
                 </a:solidFill>
                 <a:latin typeface="PingFang SC"/>
               </a:rPr>
-              <a:t>地址透明性和全球唯一地址。“端到端”设计原则需要给</a:t>
+              <a:t>地址透明性和全球唯一地址。“端到端”设计原则上需要给</a:t>
             </a:r>
             <a:r>
               <a:rPr lang="en-US" altLang="zh-CN" dirty="0">
@@ -4564,7 +4564,169 @@
                 </a:solidFill>
                 <a:latin typeface="PingFang SC"/>
               </a:rPr>
-              <a:t>上 的主机 分配全球唯一的地址以用于标识不同的主机，这样在传输的过程中不需要中间的节点或者转发节点对于包的内容进行修改。在数据包中包括了来源和目的地的完整的 信息，中间的路由等转发节点也不需要去知道该数据包的信息。在这个意义上，数据在端系统之间的传输好像是有唯一的通路直接相连。这样，端系统上的应 用程 序也不需要知道实际传输的具体的线路，为实际应用也带来了方便。</a:t>
+              <a:t>上 的主机 分配全球唯一</a:t>
+            </a:r>
+            <a:r>
+              <a:rPr lang="zh-CN" altLang="en-US">
+                <a:solidFill>
+                  <a:srgbClr val="000000"/>
+                </a:solidFill>
+                <a:latin typeface="PingFang SC"/>
+              </a:rPr>
+              <a:t>的地址用于</a:t>
+            </a:r>
+            <a:r>
+              <a:rPr lang="zh-CN" altLang="en-US" dirty="0">
+                <a:solidFill>
+                  <a:srgbClr val="000000"/>
+                </a:solidFill>
+                <a:latin typeface="PingFang SC"/>
+              </a:rPr>
+              <a:t>标识不同的主机，这样在传输的</a:t>
+            </a:r>
+            <a:r>
+              <a:rPr lang="zh-CN" altLang="en-US">
+                <a:solidFill>
+                  <a:srgbClr val="000000"/>
+                </a:solidFill>
+                <a:latin typeface="PingFang SC"/>
+              </a:rPr>
+              <a:t>过程中就不</a:t>
+            </a:r>
+            <a:r>
+              <a:rPr lang="zh-CN" altLang="en-US" dirty="0">
+                <a:solidFill>
+                  <a:srgbClr val="000000"/>
+                </a:solidFill>
+                <a:latin typeface="PingFang SC"/>
+              </a:rPr>
+              <a:t>需要中间的</a:t>
+            </a:r>
+            <a:r>
+              <a:rPr lang="zh-CN" altLang="en-US">
+                <a:solidFill>
+                  <a:srgbClr val="000000"/>
+                </a:solidFill>
+                <a:latin typeface="PingFang SC"/>
+              </a:rPr>
+              <a:t>节点或者是转发</a:t>
+            </a:r>
+            <a:r>
+              <a:rPr lang="zh-CN" altLang="en-US" dirty="0">
+                <a:solidFill>
+                  <a:srgbClr val="000000"/>
+                </a:solidFill>
+                <a:latin typeface="PingFang SC"/>
+              </a:rPr>
+              <a:t>节点对于包的内容进行修改。在数据包中包括了来源和目的地的完整的 信息，中间</a:t>
+            </a:r>
+            <a:r>
+              <a:rPr lang="zh-CN" altLang="en-US">
+                <a:solidFill>
+                  <a:srgbClr val="000000"/>
+                </a:solidFill>
+                <a:latin typeface="PingFang SC"/>
+              </a:rPr>
+              <a:t>的路由这种转发</a:t>
+            </a:r>
+            <a:r>
+              <a:rPr lang="zh-CN" altLang="en-US" dirty="0">
+                <a:solidFill>
+                  <a:srgbClr val="000000"/>
+                </a:solidFill>
+                <a:latin typeface="PingFang SC"/>
+              </a:rPr>
+              <a:t>节点也不需要去</a:t>
+            </a:r>
+            <a:r>
+              <a:rPr lang="zh-CN" altLang="en-US">
+                <a:solidFill>
+                  <a:srgbClr val="000000"/>
+                </a:solidFill>
+                <a:latin typeface="PingFang SC"/>
+              </a:rPr>
+              <a:t>知道该包</a:t>
+            </a:r>
+            <a:r>
+              <a:rPr lang="zh-CN" altLang="en-US" dirty="0">
+                <a:solidFill>
+                  <a:srgbClr val="000000"/>
+                </a:solidFill>
+                <a:latin typeface="PingFang SC"/>
+              </a:rPr>
+              <a:t>的信息。在这个意义上，数据在端系统之间</a:t>
+            </a:r>
+            <a:r>
+              <a:rPr lang="zh-CN" altLang="en-US">
+                <a:solidFill>
+                  <a:srgbClr val="000000"/>
+                </a:solidFill>
+                <a:latin typeface="PingFang SC"/>
+              </a:rPr>
+              <a:t>的传输就好像是有一种唯一的通道直接</a:t>
+            </a:r>
+            <a:r>
+              <a:rPr lang="zh-CN" altLang="en-US" dirty="0">
+                <a:solidFill>
+                  <a:srgbClr val="000000"/>
+                </a:solidFill>
+                <a:latin typeface="PingFang SC"/>
+              </a:rPr>
+              <a:t>相连</a:t>
+            </a:r>
+            <a:r>
+              <a:rPr lang="zh-CN" altLang="en-US">
+                <a:solidFill>
+                  <a:srgbClr val="000000"/>
+                </a:solidFill>
+                <a:latin typeface="PingFang SC"/>
+              </a:rPr>
+              <a:t>。这样一来，</a:t>
+            </a:r>
+            <a:r>
+              <a:rPr lang="zh-CN" altLang="en-US" dirty="0">
+                <a:solidFill>
+                  <a:srgbClr val="000000"/>
+                </a:solidFill>
+                <a:latin typeface="PingFang SC"/>
+              </a:rPr>
+              <a:t>端系统上的应 用程 序也不需要知道实际传输</a:t>
+            </a:r>
+            <a:r>
+              <a:rPr lang="zh-CN" altLang="en-US">
+                <a:solidFill>
+                  <a:srgbClr val="000000"/>
+                </a:solidFill>
+                <a:latin typeface="PingFang SC"/>
+              </a:rPr>
+              <a:t>的具体线路</a:t>
+            </a:r>
+            <a:r>
+              <a:rPr lang="zh-CN" altLang="en-US" dirty="0">
+                <a:solidFill>
+                  <a:srgbClr val="000000"/>
+                </a:solidFill>
+                <a:latin typeface="PingFang SC"/>
+              </a:rPr>
+              <a:t>，</a:t>
+            </a:r>
+            <a:r>
+              <a:rPr lang="zh-CN" altLang="en-US">
+                <a:solidFill>
+                  <a:srgbClr val="000000"/>
+                </a:solidFill>
+                <a:latin typeface="PingFang SC"/>
+              </a:rPr>
+              <a:t>为实际的应用</a:t>
+            </a:r>
+            <a:r>
+              <a:rPr lang="zh-CN" altLang="en-US" dirty="0">
+                <a:solidFill>
+                  <a:srgbClr val="000000"/>
+                </a:solidFill>
+                <a:latin typeface="PingFang SC"/>
+              </a:rPr>
+              <a:t>也带来了方便。</a:t>
             </a:r>
             <a:endParaRPr lang="zh-CN" altLang="en-US" dirty="0"/>
           </a:p>
@@ -7838,7 +8000,7 @@
         <p:spPr bwMode="auto">
           <a:xfrm>
             <a:off x="1651200" y="4117410"/>
-            <a:ext cx="4429423" cy="830997"/>
+            <a:ext cx="4429423" cy="1077218"/>
           </a:xfrm>
           <a:prstGeom prst="rect">
             <a:avLst/>
@@ -7992,7 +8154,7 @@
                 <a:ea typeface="思源黑体 CN Normal" panose="020B0400000000000000" pitchFamily="34" charset="-122"/>
                 <a:sym typeface="Century Gothic" panose="020B0502020202020204" pitchFamily="34" charset="0"/>
               </a:rPr>
-              <a:t>作者认为在网络的底 层应该简化结构，把更多的功能实现，如数据确认和重传、安全加密 等功能放到高层网络实现，效率会更 高，</a:t>
+              <a:t>作者认为在网络的底 层应该简化结构，把更多的功能实现，比如数据确认和重传、安全加密 这些功能放到高层网络去实现，这样的话效率会更 高，</a:t>
             </a:r>
           </a:p>
         </p:txBody>
@@ -8396,7 +8558,7 @@
         <p:spPr>
           <a:xfrm>
             <a:off x="5331382" y="2390183"/>
-            <a:ext cx="5387506" cy="1200329"/>
+            <a:ext cx="5387506" cy="1477328"/>
           </a:xfrm>
           <a:prstGeom prst="rect">
             <a:avLst/>
@@ -8415,7 +8577,7 @@
                 </a:solidFill>
                 <a:latin typeface="PingFang SC"/>
               </a:rPr>
-              <a:t>在</a:t>
+              <a:t>图中是一个从主机</a:t>
             </a:r>
             <a:r>
               <a:rPr lang="en-US" altLang="zh-CN" dirty="0">
@@ -8424,7 +8586,7 @@
                 </a:solidFill>
                 <a:latin typeface="PingFang SC"/>
               </a:rPr>
-              <a:t>A-B</a:t>
+              <a:t>A</a:t>
             </a:r>
             <a:r>
               <a:rPr lang="zh-CN" altLang="en-US" dirty="0">
@@ -8433,7 +8595,25 @@
                 </a:solidFill>
                 <a:latin typeface="PingFang SC"/>
               </a:rPr>
-              <a:t>文件传输过程中可能遇到诸多难以控制的风险，包括文件本身出 错、通信传输过程出错、接收过程出错、数据包完整性的度量以及其 他一些 未知的错误发 生。</a:t>
+              <a:t>到主机</a:t>
+            </a:r>
+            <a:r>
+              <a:rPr lang="en-US" altLang="zh-CN" dirty="0">
+                <a:solidFill>
+                  <a:srgbClr val="000000"/>
+                </a:solidFill>
+                <a:latin typeface="PingFang SC"/>
+              </a:rPr>
+              <a:t>B</a:t>
+            </a:r>
+            <a:r>
+              <a:rPr lang="zh-CN" altLang="en-US" dirty="0">
+                <a:solidFill>
+                  <a:srgbClr val="000000"/>
+                </a:solidFill>
+                <a:latin typeface="PingFang SC"/>
+              </a:rPr>
+              <a:t>文件传输的抽象图，在文件传输过程中可能遇到很多难以控制的风险，比如文件本身出 错、通信传输过程出错、接收过程出错、数据包完整性的度量还有其 他一些 未知的错误都有可能发 生。</a:t>
             </a:r>
             <a:endParaRPr lang="zh-CN" altLang="en-US" dirty="0"/>
           </a:p>
@@ -8817,13 +8997,13 @@
           <a:lstStyle/>
           <a:p>
             <a:r>
-              <a:rPr lang="zh-CN" altLang="en-US">
+              <a:rPr lang="zh-CN" altLang="en-US" dirty="0">
                 <a:solidFill>
                   <a:srgbClr val="000000"/>
                 </a:solidFill>
                 <a:latin typeface="PingFang SC"/>
               </a:rPr>
-              <a:t> 作者讨论了当前技术条件下解决文件传输错 误的几种途径</a:t>
+              <a:t> 作者讨论了当时技术条件下解决文件传输错 误的几种途径</a:t>
             </a:r>
             <a:endParaRPr lang="zh-CN" altLang="en-US" dirty="0"/>
           </a:p>
@@ -9023,11 +9203,11 @@
                 </a:solidFill>
                 <a:latin typeface="PingFang SC"/>
               </a:rPr>
-              <a:t>虽然这些方法去除一些威胁，但不足以去除 所有的威胁。并且</a:t>
+              <a:t>虽然这些方法的确能够去除一些威胁，但是不足以去除 所有的威胁。并且我们</a:t>
             </a:r>
             <a:r>
               <a:rPr lang="zh-CN" altLang="en-US" dirty="0"/>
-              <a:t>从性能分析的角度讲，基于一个不可靠的网路建立 一个可靠的文 件传输，底层网络可以实现完善的功能，但是非常复杂并且代价太大。然而像实现数据的可靠传输，建立错误的检查功能在高层比如应用层也能实现，并且更简单，代价也小得多。</a:t>
+              <a:t>从性能分析的角度来说，基于一个不可靠的网络来建立 一个可靠的文 件传输，底层网络确实可以实现完善的功能，但是非常复杂并且代价太大。然而像实现数据的可靠传输，建立错误的检查这样的功能在高层比如应用层也能实现，而且更加简单，代价也小很多。</a:t>
             </a:r>
           </a:p>
         </p:txBody>
@@ -9062,44 +9242,6 @@
           <a:chExt cx="0" cy="0"/>
         </a:xfrm>
       </p:grpSpPr>
-      <p:cxnSp>
-        <p:nvCxnSpPr>
-          <p:cNvPr id="15" name="直接连接符 14"/>
-          <p:cNvCxnSpPr/>
-          <p:nvPr/>
-        </p:nvCxnSpPr>
-        <p:spPr>
-          <a:xfrm>
-            <a:off x="5912877" y="4688142"/>
-            <a:ext cx="0" cy="476250"/>
-          </a:xfrm>
-          <a:prstGeom prst="line">
-            <a:avLst/>
-          </a:prstGeom>
-          <a:ln>
-            <a:solidFill>
-              <a:schemeClr val="bg2">
-                <a:lumMod val="50000"/>
-              </a:schemeClr>
-            </a:solidFill>
-            <a:prstDash val="dash"/>
-          </a:ln>
-        </p:spPr>
-        <p:style>
-          <a:lnRef idx="1">
-            <a:schemeClr val="accent1"/>
-          </a:lnRef>
-          <a:fillRef idx="0">
-            <a:schemeClr val="accent1"/>
-          </a:fillRef>
-          <a:effectRef idx="0">
-            <a:schemeClr val="accent1"/>
-          </a:effectRef>
-          <a:fontRef idx="minor">
-            <a:schemeClr val="tx1"/>
-          </a:fontRef>
-        </p:style>
-      </p:cxnSp>
       <p:sp>
         <p:nvSpPr>
           <p:cNvPr id="18" name="矩形 17"/>
@@ -9108,7 +9250,7 @@
         </p:nvSpPr>
         <p:spPr>
           <a:xfrm>
-            <a:off x="2775084" y="2236374"/>
+            <a:off x="2227761" y="1975753"/>
             <a:ext cx="2373347" cy="1362489"/>
           </a:xfrm>
           <a:prstGeom prst="rect">
@@ -9235,7 +9377,7 @@
         </p:nvSpPr>
         <p:spPr>
           <a:xfrm>
-            <a:off x="1762485" y="4156129"/>
+            <a:off x="1670190" y="3946611"/>
             <a:ext cx="2373347" cy="845424"/>
           </a:xfrm>
           <a:prstGeom prst="rect">
@@ -9293,7 +9435,7 @@
                 <a:ea typeface="思源黑体 CN Normal" panose="020B0400000000000000" pitchFamily="34" charset="-122"/>
                 <a:sym typeface="Century Gothic" panose="020B0502020202020204" pitchFamily="34" charset="0"/>
               </a:rPr>
-              <a:t>、为防范网路对重复信 息的抑制，高层可以实现对数据重复请 求的鉴别；</a:t>
+              <a:t>、为防范网络对重复信 息的抑制，高层可以实现对数据重复请 求的鉴别；</a:t>
             </a:r>
           </a:p>
         </p:txBody>
@@ -9306,7 +9448,7 @@
         </p:nvSpPr>
         <p:spPr>
           <a:xfrm>
-            <a:off x="4726203" y="5278417"/>
+            <a:off x="4601108" y="5652609"/>
             <a:ext cx="2373347" cy="1103957"/>
           </a:xfrm>
           <a:prstGeom prst="rect">
@@ -9377,7 +9519,7 @@
         </p:nvSpPr>
         <p:spPr>
           <a:xfrm>
-            <a:off x="7443905" y="1520309"/>
+            <a:off x="8112120" y="1485599"/>
             <a:ext cx="2988568" cy="1600438"/>
           </a:xfrm>
           <a:prstGeom prst="rect">
@@ -9419,7 +9561,7 @@
         </p:nvSpPr>
         <p:spPr>
           <a:xfrm>
-            <a:off x="7950891" y="4651423"/>
+            <a:off x="9005968" y="5278416"/>
             <a:ext cx="2373347" cy="1103957"/>
           </a:xfrm>
           <a:prstGeom prst="rect">
@@ -9774,449 +9916,6 @@
       </p:pic>
       <p:sp>
         <p:nvSpPr>
-          <p:cNvPr id="28" name="itinerary_90535">
-            <a:extLst>
-              <a:ext uri="{FF2B5EF4-FFF2-40B4-BE49-F238E27FC236}">
-                <a16:creationId xmlns:a16="http://schemas.microsoft.com/office/drawing/2014/main" id="{B6E7776A-B16A-4DFB-9C4C-8B6D591B5C1D}"/>
-              </a:ext>
-            </a:extLst>
-          </p:cNvPr>
-          <p:cNvSpPr>
-            <a:spLocks noChangeAspect="1"/>
-          </p:cNvSpPr>
-          <p:nvPr/>
-        </p:nvSpPr>
-        <p:spPr bwMode="auto">
-          <a:xfrm flipH="1">
-            <a:off x="4286786" y="2713315"/>
-            <a:ext cx="3664105" cy="2288238"/>
-          </a:xfrm>
-          <a:custGeom>
-            <a:avLst/>
-            <a:gdLst>
-              <a:gd name="T0" fmla="*/ 2698 w 2798"/>
-              <a:gd name="T1" fmla="*/ 1449 h 1750"/>
-              <a:gd name="T2" fmla="*/ 898 w 2798"/>
-              <a:gd name="T3" fmla="*/ 1449 h 1750"/>
-              <a:gd name="T4" fmla="*/ 723 w 2798"/>
-              <a:gd name="T5" fmla="*/ 1348 h 1750"/>
-              <a:gd name="T6" fmla="*/ 548 w 2798"/>
-              <a:gd name="T7" fmla="*/ 1449 h 1750"/>
-              <a:gd name="T8" fmla="*/ 336 w 2798"/>
-              <a:gd name="T9" fmla="*/ 1449 h 1750"/>
-              <a:gd name="T10" fmla="*/ 200 w 2798"/>
-              <a:gd name="T11" fmla="*/ 1314 h 1750"/>
-              <a:gd name="T12" fmla="*/ 336 w 2798"/>
-              <a:gd name="T13" fmla="*/ 1178 h 1750"/>
-              <a:gd name="T14" fmla="*/ 1600 w 2798"/>
-              <a:gd name="T15" fmla="*/ 1178 h 1750"/>
-              <a:gd name="T16" fmla="*/ 1767 w 2798"/>
-              <a:gd name="T17" fmla="*/ 1267 h 1750"/>
-              <a:gd name="T18" fmla="*/ 1934 w 2798"/>
-              <a:gd name="T19" fmla="*/ 1178 h 1750"/>
-              <a:gd name="T20" fmla="*/ 2265 w 2798"/>
-              <a:gd name="T21" fmla="*/ 1178 h 1750"/>
-              <a:gd name="T22" fmla="*/ 2568 w 2798"/>
-              <a:gd name="T23" fmla="*/ 875 h 1750"/>
-              <a:gd name="T24" fmla="*/ 2265 w 2798"/>
-              <a:gd name="T25" fmla="*/ 572 h 1750"/>
-              <a:gd name="T26" fmla="*/ 793 w 2798"/>
-              <a:gd name="T27" fmla="*/ 572 h 1750"/>
-              <a:gd name="T28" fmla="*/ 657 w 2798"/>
-              <a:gd name="T29" fmla="*/ 437 h 1750"/>
-              <a:gd name="T30" fmla="*/ 793 w 2798"/>
-              <a:gd name="T31" fmla="*/ 301 h 1750"/>
-              <a:gd name="T32" fmla="*/ 1014 w 2798"/>
-              <a:gd name="T33" fmla="*/ 301 h 1750"/>
-              <a:gd name="T34" fmla="*/ 1189 w 2798"/>
-              <a:gd name="T35" fmla="*/ 402 h 1750"/>
-              <a:gd name="T36" fmla="*/ 1363 w 2798"/>
-              <a:gd name="T37" fmla="*/ 301 h 1750"/>
-              <a:gd name="T38" fmla="*/ 1969 w 2798"/>
-              <a:gd name="T39" fmla="*/ 301 h 1750"/>
-              <a:gd name="T40" fmla="*/ 2069 w 2798"/>
-              <a:gd name="T41" fmla="*/ 201 h 1750"/>
-              <a:gd name="T42" fmla="*/ 1969 w 2798"/>
-              <a:gd name="T43" fmla="*/ 101 h 1750"/>
-              <a:gd name="T44" fmla="*/ 1363 w 2798"/>
-              <a:gd name="T45" fmla="*/ 101 h 1750"/>
-              <a:gd name="T46" fmla="*/ 1189 w 2798"/>
-              <a:gd name="T47" fmla="*/ 0 h 1750"/>
-              <a:gd name="T48" fmla="*/ 1014 w 2798"/>
-              <a:gd name="T49" fmla="*/ 101 h 1750"/>
-              <a:gd name="T50" fmla="*/ 793 w 2798"/>
-              <a:gd name="T51" fmla="*/ 101 h 1750"/>
-              <a:gd name="T52" fmla="*/ 457 w 2798"/>
-              <a:gd name="T53" fmla="*/ 437 h 1750"/>
-              <a:gd name="T54" fmla="*/ 793 w 2798"/>
-              <a:gd name="T55" fmla="*/ 772 h 1750"/>
-              <a:gd name="T56" fmla="*/ 2265 w 2798"/>
-              <a:gd name="T57" fmla="*/ 772 h 1750"/>
-              <a:gd name="T58" fmla="*/ 2368 w 2798"/>
-              <a:gd name="T59" fmla="*/ 875 h 1750"/>
-              <a:gd name="T60" fmla="*/ 2265 w 2798"/>
-              <a:gd name="T61" fmla="*/ 978 h 1750"/>
-              <a:gd name="T62" fmla="*/ 1948 w 2798"/>
-              <a:gd name="T63" fmla="*/ 978 h 1750"/>
-              <a:gd name="T64" fmla="*/ 1767 w 2798"/>
-              <a:gd name="T65" fmla="*/ 864 h 1750"/>
-              <a:gd name="T66" fmla="*/ 1586 w 2798"/>
-              <a:gd name="T67" fmla="*/ 978 h 1750"/>
-              <a:gd name="T68" fmla="*/ 336 w 2798"/>
-              <a:gd name="T69" fmla="*/ 978 h 1750"/>
-              <a:gd name="T70" fmla="*/ 0 w 2798"/>
-              <a:gd name="T71" fmla="*/ 1314 h 1750"/>
-              <a:gd name="T72" fmla="*/ 336 w 2798"/>
-              <a:gd name="T73" fmla="*/ 1649 h 1750"/>
-              <a:gd name="T74" fmla="*/ 548 w 2798"/>
-              <a:gd name="T75" fmla="*/ 1649 h 1750"/>
-              <a:gd name="T76" fmla="*/ 723 w 2798"/>
-              <a:gd name="T77" fmla="*/ 1750 h 1750"/>
-              <a:gd name="T78" fmla="*/ 898 w 2798"/>
-              <a:gd name="T79" fmla="*/ 1649 h 1750"/>
-              <a:gd name="T80" fmla="*/ 2698 w 2798"/>
-              <a:gd name="T81" fmla="*/ 1649 h 1750"/>
-              <a:gd name="T82" fmla="*/ 2798 w 2798"/>
-              <a:gd name="T83" fmla="*/ 1549 h 1750"/>
-              <a:gd name="T84" fmla="*/ 2698 w 2798"/>
-              <a:gd name="T85" fmla="*/ 1449 h 1750"/>
-            </a:gdLst>
-            <a:ahLst/>
-            <a:cxnLst>
-              <a:cxn ang="0">
-                <a:pos x="T0" y="T1"/>
-              </a:cxn>
-              <a:cxn ang="0">
-                <a:pos x="T2" y="T3"/>
-              </a:cxn>
-              <a:cxn ang="0">
-                <a:pos x="T4" y="T5"/>
-              </a:cxn>
-              <a:cxn ang="0">
-                <a:pos x="T6" y="T7"/>
-              </a:cxn>
-              <a:cxn ang="0">
-                <a:pos x="T8" y="T9"/>
-              </a:cxn>
-              <a:cxn ang="0">
-                <a:pos x="T10" y="T11"/>
-              </a:cxn>
-              <a:cxn ang="0">
-                <a:pos x="T12" y="T13"/>
-              </a:cxn>
-              <a:cxn ang="0">
-                <a:pos x="T14" y="T15"/>
-              </a:cxn>
-              <a:cxn ang="0">
-                <a:pos x="T16" y="T17"/>
-              </a:cxn>
-              <a:cxn ang="0">
-                <a:pos x="T18" y="T19"/>
-              </a:cxn>
-              <a:cxn ang="0">
-                <a:pos x="T20" y="T21"/>
-              </a:cxn>
-              <a:cxn ang="0">
-                <a:pos x="T22" y="T23"/>
-              </a:cxn>
-              <a:cxn ang="0">
-                <a:pos x="T24" y="T25"/>
-              </a:cxn>
-              <a:cxn ang="0">
-                <a:pos x="T26" y="T27"/>
-              </a:cxn>
-              <a:cxn ang="0">
-                <a:pos x="T28" y="T29"/>
-              </a:cxn>
-              <a:cxn ang="0">
-                <a:pos x="T30" y="T31"/>
-              </a:cxn>
-              <a:cxn ang="0">
-                <a:pos x="T32" y="T33"/>
-              </a:cxn>
-              <a:cxn ang="0">
-                <a:pos x="T34" y="T35"/>
-              </a:cxn>
-              <a:cxn ang="0">
-                <a:pos x="T36" y="T37"/>
-              </a:cxn>
-              <a:cxn ang="0">
-                <a:pos x="T38" y="T39"/>
-              </a:cxn>
-              <a:cxn ang="0">
-                <a:pos x="T40" y="T41"/>
-              </a:cxn>
-              <a:cxn ang="0">
-                <a:pos x="T42" y="T43"/>
-              </a:cxn>
-              <a:cxn ang="0">
-                <a:pos x="T44" y="T45"/>
-              </a:cxn>
-              <a:cxn ang="0">
-                <a:pos x="T46" y="T47"/>
-              </a:cxn>
-              <a:cxn ang="0">
-                <a:pos x="T48" y="T49"/>
-              </a:cxn>
-              <a:cxn ang="0">
-                <a:pos x="T50" y="T51"/>
-              </a:cxn>
-              <a:cxn ang="0">
-                <a:pos x="T52" y="T53"/>
-              </a:cxn>
-              <a:cxn ang="0">
-                <a:pos x="T54" y="T55"/>
-              </a:cxn>
-              <a:cxn ang="0">
-                <a:pos x="T56" y="T57"/>
-              </a:cxn>
-              <a:cxn ang="0">
-                <a:pos x="T58" y="T59"/>
-              </a:cxn>
-              <a:cxn ang="0">
-                <a:pos x="T60" y="T61"/>
-              </a:cxn>
-              <a:cxn ang="0">
-                <a:pos x="T62" y="T63"/>
-              </a:cxn>
-              <a:cxn ang="0">
-                <a:pos x="T64" y="T65"/>
-              </a:cxn>
-              <a:cxn ang="0">
-                <a:pos x="T66" y="T67"/>
-              </a:cxn>
-              <a:cxn ang="0">
-                <a:pos x="T68" y="T69"/>
-              </a:cxn>
-              <a:cxn ang="0">
-                <a:pos x="T70" y="T71"/>
-              </a:cxn>
-              <a:cxn ang="0">
-                <a:pos x="T72" y="T73"/>
-              </a:cxn>
-              <a:cxn ang="0">
-                <a:pos x="T74" y="T75"/>
-              </a:cxn>
-              <a:cxn ang="0">
-                <a:pos x="T76" y="T77"/>
-              </a:cxn>
-              <a:cxn ang="0">
-                <a:pos x="T78" y="T79"/>
-              </a:cxn>
-              <a:cxn ang="0">
-                <a:pos x="T80" y="T81"/>
-              </a:cxn>
-              <a:cxn ang="0">
-                <a:pos x="T82" y="T83"/>
-              </a:cxn>
-              <a:cxn ang="0">
-                <a:pos x="T84" y="T85"/>
-              </a:cxn>
-            </a:cxnLst>
-            <a:rect l="0" t="0" r="r" b="b"/>
-            <a:pathLst>
-              <a:path w="2798" h="1750">
-                <a:moveTo>
-                  <a:pt x="2698" y="1449"/>
-                </a:moveTo>
-                <a:lnTo>
-                  <a:pt x="898" y="1449"/>
-                </a:lnTo>
-                <a:cubicBezTo>
-                  <a:pt x="863" y="1389"/>
-                  <a:pt x="798" y="1348"/>
-                  <a:pt x="723" y="1348"/>
-                </a:cubicBezTo>
-                <a:cubicBezTo>
-                  <a:pt x="648" y="1348"/>
-                  <a:pt x="583" y="1389"/>
-                  <a:pt x="548" y="1449"/>
-                </a:cubicBezTo>
-                <a:lnTo>
-                  <a:pt x="336" y="1449"/>
-                </a:lnTo>
-                <a:cubicBezTo>
-                  <a:pt x="261" y="1449"/>
-                  <a:pt x="200" y="1388"/>
-                  <a:pt x="200" y="1314"/>
-                </a:cubicBezTo>
-                <a:cubicBezTo>
-                  <a:pt x="200" y="1239"/>
-                  <a:pt x="261" y="1178"/>
-                  <a:pt x="336" y="1178"/>
-                </a:cubicBezTo>
-                <a:lnTo>
-                  <a:pt x="1600" y="1178"/>
-                </a:lnTo>
-                <a:cubicBezTo>
-                  <a:pt x="1636" y="1232"/>
-                  <a:pt x="1698" y="1267"/>
-                  <a:pt x="1767" y="1267"/>
-                </a:cubicBezTo>
-                <a:cubicBezTo>
-                  <a:pt x="1837" y="1267"/>
-                  <a:pt x="1898" y="1232"/>
-                  <a:pt x="1934" y="1178"/>
-                </a:cubicBezTo>
-                <a:lnTo>
-                  <a:pt x="2265" y="1178"/>
-                </a:lnTo>
-                <a:cubicBezTo>
-                  <a:pt x="2432" y="1178"/>
-                  <a:pt x="2568" y="1042"/>
-                  <a:pt x="2568" y="875"/>
-                </a:cubicBezTo>
-                <a:cubicBezTo>
-                  <a:pt x="2568" y="708"/>
-                  <a:pt x="2432" y="572"/>
-                  <a:pt x="2265" y="572"/>
-                </a:cubicBezTo>
-                <a:lnTo>
-                  <a:pt x="793" y="572"/>
-                </a:lnTo>
-                <a:cubicBezTo>
-                  <a:pt x="718" y="572"/>
-                  <a:pt x="657" y="511"/>
-                  <a:pt x="657" y="437"/>
-                </a:cubicBezTo>
-                <a:cubicBezTo>
-                  <a:pt x="657" y="362"/>
-                  <a:pt x="718" y="301"/>
-                  <a:pt x="793" y="301"/>
-                </a:cubicBezTo>
-                <a:lnTo>
-                  <a:pt x="1014" y="301"/>
-                </a:lnTo>
-                <a:cubicBezTo>
-                  <a:pt x="1049" y="362"/>
-                  <a:pt x="1114" y="402"/>
-                  <a:pt x="1189" y="402"/>
-                </a:cubicBezTo>
-                <a:cubicBezTo>
-                  <a:pt x="1263" y="402"/>
-                  <a:pt x="1328" y="362"/>
-                  <a:pt x="1363" y="301"/>
-                </a:cubicBezTo>
-                <a:lnTo>
-                  <a:pt x="1969" y="301"/>
-                </a:lnTo>
-                <a:cubicBezTo>
-                  <a:pt x="2024" y="301"/>
-                  <a:pt x="2069" y="256"/>
-                  <a:pt x="2069" y="201"/>
-                </a:cubicBezTo>
-                <a:cubicBezTo>
-                  <a:pt x="2069" y="146"/>
-                  <a:pt x="2024" y="101"/>
-                  <a:pt x="1969" y="101"/>
-                </a:cubicBezTo>
-                <a:lnTo>
-                  <a:pt x="1363" y="101"/>
-                </a:lnTo>
-                <a:cubicBezTo>
-                  <a:pt x="1328" y="41"/>
-                  <a:pt x="1263" y="0"/>
-                  <a:pt x="1189" y="0"/>
-                </a:cubicBezTo>
-                <a:cubicBezTo>
-                  <a:pt x="1114" y="0"/>
-                  <a:pt x="1049" y="41"/>
-                  <a:pt x="1014" y="101"/>
-                </a:cubicBezTo>
-                <a:lnTo>
-                  <a:pt x="793" y="101"/>
-                </a:lnTo>
-                <a:cubicBezTo>
-                  <a:pt x="608" y="101"/>
-                  <a:pt x="457" y="252"/>
-                  <a:pt x="457" y="437"/>
-                </a:cubicBezTo>
-                <a:cubicBezTo>
-                  <a:pt x="457" y="622"/>
-                  <a:pt x="608" y="772"/>
-                  <a:pt x="793" y="772"/>
-                </a:cubicBezTo>
-                <a:lnTo>
-                  <a:pt x="2265" y="772"/>
-                </a:lnTo>
-                <a:cubicBezTo>
-                  <a:pt x="2321" y="772"/>
-                  <a:pt x="2368" y="818"/>
-                  <a:pt x="2368" y="875"/>
-                </a:cubicBezTo>
-                <a:cubicBezTo>
-                  <a:pt x="2368" y="932"/>
-                  <a:pt x="2321" y="978"/>
-                  <a:pt x="2265" y="978"/>
-                </a:cubicBezTo>
-                <a:lnTo>
-                  <a:pt x="1948" y="978"/>
-                </a:lnTo>
-                <a:cubicBezTo>
-                  <a:pt x="1916" y="911"/>
-                  <a:pt x="1847" y="864"/>
-                  <a:pt x="1767" y="864"/>
-                </a:cubicBezTo>
-                <a:cubicBezTo>
-                  <a:pt x="1688" y="864"/>
-                  <a:pt x="1619" y="911"/>
-                  <a:pt x="1586" y="978"/>
-                </a:cubicBezTo>
-                <a:lnTo>
-                  <a:pt x="336" y="978"/>
-                </a:lnTo>
-                <a:cubicBezTo>
-                  <a:pt x="151" y="978"/>
-                  <a:pt x="0" y="1129"/>
-                  <a:pt x="0" y="1314"/>
-                </a:cubicBezTo>
-                <a:cubicBezTo>
-                  <a:pt x="0" y="1499"/>
-                  <a:pt x="151" y="1649"/>
-                  <a:pt x="336" y="1649"/>
-                </a:cubicBezTo>
-                <a:lnTo>
-                  <a:pt x="548" y="1649"/>
-                </a:lnTo>
-                <a:cubicBezTo>
-                  <a:pt x="583" y="1710"/>
-                  <a:pt x="648" y="1750"/>
-                  <a:pt x="723" y="1750"/>
-                </a:cubicBezTo>
-                <a:cubicBezTo>
-                  <a:pt x="798" y="1750"/>
-                  <a:pt x="863" y="1710"/>
-                  <a:pt x="898" y="1649"/>
-                </a:cubicBezTo>
-                <a:lnTo>
-                  <a:pt x="2698" y="1649"/>
-                </a:lnTo>
-                <a:cubicBezTo>
-                  <a:pt x="2754" y="1649"/>
-                  <a:pt x="2798" y="1604"/>
-                  <a:pt x="2798" y="1549"/>
-                </a:cubicBezTo>
-                <a:cubicBezTo>
-                  <a:pt x="2798" y="1494"/>
-                  <a:pt x="2754" y="1449"/>
-                  <a:pt x="2698" y="1449"/>
-                </a:cubicBezTo>
-                <a:close/>
-              </a:path>
-            </a:pathLst>
-          </a:custGeom>
-          <a:solidFill>
-            <a:schemeClr val="accent6">
-              <a:lumMod val="75000"/>
-            </a:schemeClr>
-          </a:solidFill>
-          <a:ln>
-            <a:noFill/>
-          </a:ln>
-        </p:spPr>
-      </p:sp>
-      <p:sp>
-        <p:nvSpPr>
           <p:cNvPr id="29" name="矩形 28">
             <a:extLst>
               <a:ext uri="{FF2B5EF4-FFF2-40B4-BE49-F238E27FC236}">
@@ -10229,8 +9928,8 @@
         </p:nvSpPr>
         <p:spPr>
           <a:xfrm>
-            <a:off x="852305" y="5828219"/>
-            <a:ext cx="3283527" cy="2585323"/>
+            <a:off x="4480018" y="3215161"/>
+            <a:ext cx="3767165" cy="2308324"/>
           </a:xfrm>
           <a:prstGeom prst="rect">
             <a:avLst/>
@@ -10249,7 +9948,7 @@
                 </a:solidFill>
                 <a:latin typeface="PingFang SC"/>
               </a:rPr>
-              <a:t>同时作者也指出，端到端的观点不是一个 硬性的绝对规则，而是一个帮助 设计应用程序和协议的设计的 指导。 目前，只有金融和航空领域才有能力和需求，完成底层的数据可靠性 传输， 在其他领域端到端系统已经能够满足错误控 制和纠错处理方面 的要求了。</a:t>
+              <a:t>但同时作者也指出了，端到端的观点并不是一个 硬性的绝对规则，而是一个帮助 设计应用程序和协议的一个 指导。 当时，只有金融和航空领域才有那个能力和需求，去完成底层的数据可靠性 传输， 在其他领域端到端系统已经能够满足错误控 制和纠错处理方面 的要求了。</a:t>
             </a:r>
             <a:endParaRPr lang="zh-CN" altLang="en-US" dirty="0"/>
           </a:p>
@@ -11104,7 +10803,7 @@
                 </a:solidFill>
                 <a:latin typeface="PingFang SC"/>
               </a:rPr>
-              <a:t>其 一，降低网络核心复杂度，简化复杂功能。文件从主机</a:t>
+              <a:t>其 一，降低网络核心复杂度，简化复杂功能。我们看右图，文件从主机</a:t>
             </a:r>
             <a:r>
               <a:rPr lang="en-US" altLang="zh-CN" dirty="0">
@@ -11140,25 +10839,7 @@
                 </a:solidFill>
                 <a:latin typeface="PingFang SC"/>
               </a:rPr>
-              <a:t>，也就是说</a:t>
-            </a:r>
-            <a:r>
-              <a:rPr lang="en-US" altLang="zh-CN" dirty="0">
-                <a:solidFill>
-                  <a:srgbClr val="000000"/>
-                </a:solidFill>
-                <a:latin typeface="PingFang SC"/>
-              </a:rPr>
-              <a:t>AB</a:t>
-            </a:r>
-            <a:r>
-              <a:rPr lang="zh-CN" altLang="en-US" dirty="0">
-                <a:solidFill>
-                  <a:srgbClr val="000000"/>
-                </a:solidFill>
-                <a:latin typeface="PingFang SC"/>
-              </a:rPr>
-              <a:t>主机要通信，需要经过三个环节：首先是主机</a:t>
+              <a:t>，需要经过三个环节：首先是主机</a:t>
             </a:r>
             <a:r>
               <a:rPr lang="en-US" altLang="zh-CN" dirty="0">
@@ -11176,7 +10857,7 @@
                 </a:solidFill>
                 <a:latin typeface="PingFang SC"/>
               </a:rPr>
-              <a:t>从磁盘上读取文件并将数据分组 成一个个数据包</a:t>
+              <a:t>从磁盘上读取文件并将数据分组 成一个一个的数据包</a:t>
             </a:r>
             <a:r>
               <a:rPr lang="en-US" altLang="zh-CN" dirty="0">
@@ -11266,7 +10947,7 @@
                 </a:solidFill>
                 <a:latin typeface="PingFang SC"/>
               </a:rPr>
-              <a:t>收 到数据包并将数据包写入磁盘。在这个看似简单其实 很复杂的过程中可能会由于某些原因而影响正常通信。比如：磁盘上文件读写错误、缓冲溢出、内存出错、网络拥挤等等这些因素都有可能导致数据包的出错或者丢 失，由此可见用于通信的网络是不可靠的。那么怎么样在不可靠的网络上实现和确保两个主机之间文件的可靠传 输，即实现数据的完整而准确的传输成为通信双方 信息共享的关键。由于实现通信只要经过上述三个环节，那么我们就想是否在其中某个环节上增加一个检错纠错机制来用于对信息进行把关呢？在通信时一旦发现数 据包有问题就进行相应的处理使得到达主</a:t>
+              <a:t>收 到数据包并将数据包写入磁盘。这个过程看似简单但其实很复杂，可能会由于某些原因而影响正常通信。比如：磁盘上文件读写错误、缓冲溢出、内存出错、网络拥挤等等这些因素都有可能导致数据包的出错或者丢 失，所以用于通信的网络其实并不可靠的。那么怎么样在不可靠的网络上实现可靠传 输，也就是实现数据的完整而准确的传输成为通信双方 信息共享的关键。由于实现通信只要经过上面的三个环节，那么我们就想是否在可以在其中某个环节上增加一个检错机制来对信息进行把关呢？这样在通信时一旦发现数 据包有问题就进行相应的处理，然后使得到达主机</a:t>
             </a:r>
             <a:r>
               <a:rPr lang="en-US" altLang="zh-CN" dirty="0">
@@ -11284,7 +10965,7 @@
                 </a:solidFill>
                 <a:latin typeface="PingFang SC"/>
               </a:rPr>
-              <a:t>的数据包都是没有问题的或者说都是正确的数据包。连接主机</a:t>
+              <a:t>的数据包都是没有问题的或者说都是正确的。我们知道连接主机</a:t>
             </a:r>
             <a:r>
               <a:rPr lang="en-US" altLang="zh-CN" dirty="0">
@@ -11320,9 +11001,52 @@
                 </a:solidFill>
                 <a:latin typeface="PingFang SC"/>
               </a:rPr>
-              <a:t>的 网络在通信过程中起着桥梁的作用，同时它在整 个网络体系结构中也处于一个较低的层次，那么是不是可以把数据包的纠错任务也交给网络呢？事实证明这是行不通的。因为这不但会增加网络的复杂性而且会降低 网络的可维护，从而必须要付出昂贵的开销，这是不可取的。这时候“端系统”似乎理所当然地成为了要完成这个任 务的佼佼者。实验证明“端系统”完全可以胜 任这个工作，因为只有“端系统”可以知道哪个地方出现了错误，哪个地方需要重传。我们将确认传输正确的任务交给“端系统”去完成，在“端系统”没有接收到 完整的所需要的资源的同时，可以有多种机制来保证满足传输的正确。如将确认重传机制放在端系统的应用层上可以保 证信息的可靠到达，这样就最大的保证了传 输的可靠性和完整性。但是为了在一个原本不可靠的网络上实现可靠传输，就必须要有一个独立于网络层的可靠传输协议和一个端系统的应用层的错误检测功能。这 样一来，网络的使命就很单纯了，网络只需要负责传输数据，而其他方面都由网络以外的系统去实现了，从而大大地降低 了网络的复杂性，提高了网络的通用性和 灵活性，当增加新应用时也不必改变核心网络，便于网络的升级，提高了网络的可靠性。</a:t>
+              <a:t>的 网络在通信过程中起着桥梁的作用，同时它在整 个网络体系结构中也处于一个比较低的层次，那么是不是可以把数据包的纠错任务也交给网络呢？事实证明这是行不通的。因为这不但会增加网络的复杂性而且会降低 网络的可维护性，从而要付出昂贵的开销，这是不可取的。这时候桥梁两端的“端系统”似乎就理所当然地成为了要完成这个任 务的不二人选。实验证明“端系统”是完全可以胜 任这个工作，因为只有“端系统”可以知道哪个地方出现了错误，哪个地方需要重传。我们将确认传输正确的任务交给“端系统”去完成，在“端系统”没有接收到 完整的所需要的资源的时候，可以有多种机制来保证满足传输的正确。比如将确认重传机制放在端系统的应用层上就可以保 证信息的可靠到达，这样就最大的保证了传 输的可靠性和完整性。但是为了在一个原本不可靠的网络上实现可靠传输，就必须要有一个独立于网络层的可靠传输协议和一个端系统的应用层的错误检测功能。这 样一来，网络的使命就变得很单纯了，网络只需要负责传输数据，然后其他方面都由网络以外的系统去实现，这样一来大大地降低 了网络的复杂性，提高了网络的通用性和 灵活性，而且当增加新应用时也不必改变核心网络，也就有利于网络的升级，提高了网络的可靠性。</a:t>
             </a:r>
             <a:endParaRPr lang="zh-CN" altLang="en-US" dirty="0"/>
+          </a:p>
+        </p:txBody>
+      </p:sp>
+      <p:sp>
+        <p:nvSpPr>
+          <p:cNvPr id="2" name="文本框 1">
+            <a:extLst>
+              <a:ext uri="{FF2B5EF4-FFF2-40B4-BE49-F238E27FC236}">
+                <a16:creationId xmlns:a16="http://schemas.microsoft.com/office/drawing/2014/main" id="{9A5E4411-446D-4E59-B69C-1C953CF80791}"/>
+              </a:ext>
+            </a:extLst>
+          </p:cNvPr>
+          <p:cNvSpPr txBox="1"/>
+          <p:nvPr/>
+        </p:nvSpPr>
+        <p:spPr>
+          <a:xfrm>
+            <a:off x="4304974" y="297832"/>
+            <a:ext cx="5953762" cy="1200329"/>
+          </a:xfrm>
+          <a:prstGeom prst="rect">
+            <a:avLst/>
+          </a:prstGeom>
+          <a:noFill/>
+        </p:spPr>
+        <p:txBody>
+          <a:bodyPr wrap="square" rtlCol="0">
+            <a:spAutoFit/>
+          </a:bodyPr>
+          <a:lstStyle/>
+          <a:p>
+            <a:r>
+              <a:rPr lang="zh-CN" altLang="en-US" dirty="0"/>
+              <a:t>然后我们联系作者写这篇论文时的背景，这篇论文是</a:t>
+            </a:r>
+            <a:r>
+              <a:rPr lang="en-US" altLang="zh-CN" dirty="0"/>
+              <a:t>1984</a:t>
+            </a:r>
+            <a:r>
+              <a:rPr lang="zh-CN" altLang="en-US" dirty="0"/>
+              <a:t>年写的，那时候的计算机网络技术还处于初级阶段，作者为什么要提出这样的观点，我们尝试去理解作者想要解决的问题</a:t>
+            </a:r>
           </a:p>
         </p:txBody>
       </p:sp>

</xml_diff>